<commit_message>
cleaned code of simlab_interface
</commit_message>
<xml_diff>
--- a/setup/communication_scheme.pptx
+++ b/setup/communication_scheme.pptx
@@ -64,7 +64,7 @@
         <p:spPr>
           <a:xfrm>
             <a:off x="504000" y="301320"/>
-            <a:ext cx="9071280" cy="1261800"/>
+            <a:ext cx="9070920" cy="1261440"/>
           </a:xfrm>
           <a:prstGeom prst="rect">
             <a:avLst/>
@@ -101,7 +101,7 @@
         <p:spPr>
           <a:xfrm>
             <a:off x="504000" y="1768680"/>
-            <a:ext cx="9072000" cy="2090880"/>
+            <a:ext cx="9071640" cy="2090880"/>
           </a:xfrm>
           <a:prstGeom prst="rect">
             <a:avLst/>
@@ -137,7 +137,7 @@
         <p:spPr>
           <a:xfrm>
             <a:off x="504000" y="4058640"/>
-            <a:ext cx="9072000" cy="2090880"/>
+            <a:ext cx="9071640" cy="2090880"/>
           </a:xfrm>
           <a:prstGeom prst="rect">
             <a:avLst/>
@@ -195,7 +195,7 @@
         <p:spPr>
           <a:xfrm>
             <a:off x="504000" y="301320"/>
-            <a:ext cx="9071280" cy="1261800"/>
+            <a:ext cx="9070920" cy="1261440"/>
           </a:xfrm>
           <a:prstGeom prst="rect">
             <a:avLst/>
@@ -398,7 +398,7 @@
         <p:spPr>
           <a:xfrm>
             <a:off x="504000" y="301320"/>
-            <a:ext cx="9071280" cy="1261800"/>
+            <a:ext cx="9070920" cy="1261440"/>
           </a:xfrm>
           <a:prstGeom prst="rect">
             <a:avLst/>
@@ -435,7 +435,7 @@
         <p:spPr>
           <a:xfrm>
             <a:off x="504000" y="1768680"/>
-            <a:ext cx="9072000" cy="4384080"/>
+            <a:ext cx="9071640" cy="4383720"/>
           </a:xfrm>
           <a:prstGeom prst="rect">
             <a:avLst/>
@@ -471,7 +471,7 @@
         <p:spPr>
           <a:xfrm>
             <a:off x="504000" y="1768680"/>
-            <a:ext cx="9072000" cy="4384080"/>
+            <a:ext cx="9071640" cy="4383720"/>
           </a:xfrm>
           <a:prstGeom prst="rect">
             <a:avLst/>
@@ -506,8 +506,8 @@
         </p:blipFill>
         <p:spPr>
           <a:xfrm>
-            <a:off x="2292480" y="1768680"/>
-            <a:ext cx="5494680" cy="4384080"/>
+            <a:off x="2292480" y="1768320"/>
+            <a:ext cx="5494320" cy="4383720"/>
           </a:xfrm>
           <a:prstGeom prst="rect">
             <a:avLst/>
@@ -529,8 +529,8 @@
         </p:blipFill>
         <p:spPr>
           <a:xfrm>
-            <a:off x="2292480" y="1768680"/>
-            <a:ext cx="5494680" cy="4384080"/>
+            <a:off x="2292480" y="1768320"/>
+            <a:ext cx="5494320" cy="4383720"/>
           </a:xfrm>
           <a:prstGeom prst="rect">
             <a:avLst/>
@@ -575,7 +575,7 @@
         <p:spPr>
           <a:xfrm>
             <a:off x="504000" y="301320"/>
-            <a:ext cx="9071280" cy="1261800"/>
+            <a:ext cx="9070920" cy="1261440"/>
           </a:xfrm>
           <a:prstGeom prst="rect">
             <a:avLst/>
@@ -612,7 +612,7 @@
         <p:spPr>
           <a:xfrm>
             <a:off x="504000" y="1768680"/>
-            <a:ext cx="9072000" cy="4384080"/>
+            <a:ext cx="9071640" cy="4383720"/>
           </a:xfrm>
           <a:prstGeom prst="rect">
             <a:avLst/>
@@ -671,7 +671,7 @@
         <p:spPr>
           <a:xfrm>
             <a:off x="504000" y="301320"/>
-            <a:ext cx="9071280" cy="1261800"/>
+            <a:ext cx="9070920" cy="1261440"/>
           </a:xfrm>
           <a:prstGeom prst="rect">
             <a:avLst/>
@@ -708,7 +708,7 @@
         <p:spPr>
           <a:xfrm>
             <a:off x="504000" y="1768680"/>
-            <a:ext cx="9072000" cy="4384080"/>
+            <a:ext cx="9071640" cy="4383720"/>
           </a:xfrm>
           <a:prstGeom prst="rect">
             <a:avLst/>
@@ -766,7 +766,7 @@
         <p:spPr>
           <a:xfrm>
             <a:off x="504000" y="301320"/>
-            <a:ext cx="9071280" cy="1261800"/>
+            <a:ext cx="9070920" cy="1261440"/>
           </a:xfrm>
           <a:prstGeom prst="rect">
             <a:avLst/>
@@ -803,7 +803,7 @@
         <p:spPr>
           <a:xfrm>
             <a:off x="504000" y="1768680"/>
-            <a:ext cx="4426920" cy="4384080"/>
+            <a:ext cx="4426920" cy="4383720"/>
           </a:xfrm>
           <a:prstGeom prst="rect">
             <a:avLst/>
@@ -839,7 +839,7 @@
         <p:spPr>
           <a:xfrm>
             <a:off x="5152680" y="1768680"/>
-            <a:ext cx="4426920" cy="4384080"/>
+            <a:ext cx="4426920" cy="4383720"/>
           </a:xfrm>
           <a:prstGeom prst="rect">
             <a:avLst/>
@@ -897,7 +897,7 @@
         <p:spPr>
           <a:xfrm>
             <a:off x="504000" y="301320"/>
-            <a:ext cx="9071280" cy="1261800"/>
+            <a:ext cx="9070920" cy="1261440"/>
           </a:xfrm>
           <a:prstGeom prst="rect">
             <a:avLst/>
@@ -956,7 +956,7 @@
         <p:spPr>
           <a:xfrm>
             <a:off x="504000" y="301320"/>
-            <a:ext cx="9071280" cy="5850360"/>
+            <a:ext cx="9070920" cy="5848560"/>
           </a:xfrm>
           <a:prstGeom prst="rect">
             <a:avLst/>
@@ -1015,7 +1015,7 @@
         <p:spPr>
           <a:xfrm>
             <a:off x="504000" y="301320"/>
-            <a:ext cx="9071280" cy="1261800"/>
+            <a:ext cx="9070920" cy="1261440"/>
           </a:xfrm>
           <a:prstGeom prst="rect">
             <a:avLst/>
@@ -1124,7 +1124,7 @@
         <p:spPr>
           <a:xfrm>
             <a:off x="5152680" y="1768680"/>
-            <a:ext cx="4426920" cy="4384080"/>
+            <a:ext cx="4426920" cy="4383720"/>
           </a:xfrm>
           <a:prstGeom prst="rect">
             <a:avLst/>
@@ -1182,7 +1182,7 @@
         <p:spPr>
           <a:xfrm>
             <a:off x="504000" y="301320"/>
-            <a:ext cx="9071280" cy="1261800"/>
+            <a:ext cx="9070920" cy="1261440"/>
           </a:xfrm>
           <a:prstGeom prst="rect">
             <a:avLst/>
@@ -1219,7 +1219,7 @@
         <p:spPr>
           <a:xfrm>
             <a:off x="504000" y="1768680"/>
-            <a:ext cx="4426920" cy="4384080"/>
+            <a:ext cx="4426920" cy="4383720"/>
           </a:xfrm>
           <a:prstGeom prst="rect">
             <a:avLst/>
@@ -1349,7 +1349,7 @@
         <p:spPr>
           <a:xfrm>
             <a:off x="504000" y="301320"/>
-            <a:ext cx="9071280" cy="1261800"/>
+            <a:ext cx="9070920" cy="1261440"/>
           </a:xfrm>
           <a:prstGeom prst="rect">
             <a:avLst/>
@@ -1458,7 +1458,7 @@
         <p:spPr>
           <a:xfrm>
             <a:off x="504000" y="4058640"/>
-            <a:ext cx="9072000" cy="2090880"/>
+            <a:ext cx="9071640" cy="2090880"/>
           </a:xfrm>
           <a:prstGeom prst="rect">
             <a:avLst/>
@@ -1516,7 +1516,7 @@
         <p:spPr>
           <a:xfrm>
             <a:off x="504000" y="301320"/>
-            <a:ext cx="9071280" cy="1261800"/>
+            <a:ext cx="9070920" cy="1261440"/>
           </a:xfrm>
           <a:prstGeom prst="rect">
             <a:avLst/>
@@ -1553,7 +1553,7 @@
         <p:spPr>
           <a:xfrm>
             <a:off x="504000" y="1768680"/>
-            <a:ext cx="9072000" cy="4384080"/>
+            <a:ext cx="9071640" cy="4383720"/>
           </a:xfrm>
           <a:prstGeom prst="rect">
             <a:avLst/>
@@ -1571,7 +1571,7 @@
               <a:buChar char=""/>
             </a:pPr>
             <a:r>
-              <a:rPr b="0" lang="es-ES" sz="3200" spc="-1" strike="noStrike">
+              <a:rPr b="0" lang="es-ES" sz="1800" spc="-1" strike="noStrike">
                 <a:solidFill>
                   <a:srgbClr val="000000"/>
                 </a:solidFill>
@@ -1584,7 +1584,7 @@
               </a:rPr>
               <a:t>Pulse para editar el formato de esquema del texto</a:t>
             </a:r>
-            <a:endParaRPr b="0" lang="es-ES" sz="3200" spc="-1" strike="noStrike">
+            <a:endParaRPr b="0" lang="es-ES" sz="1800" spc="-1" strike="noStrike">
               <a:solidFill>
                 <a:srgbClr val="000000"/>
               </a:solidFill>
@@ -1606,7 +1606,7 @@
               <a:buChar char=""/>
             </a:pPr>
             <a:r>
-              <a:rPr b="0" lang="es-ES" sz="2800" spc="-1" strike="noStrike">
+              <a:rPr b="0" lang="es-ES" sz="1800" spc="-1" strike="noStrike">
                 <a:solidFill>
                   <a:srgbClr val="000000"/>
                 </a:solidFill>
@@ -1619,7 +1619,7 @@
               </a:rPr>
               <a:t>Segundo nivel del esquema</a:t>
             </a:r>
-            <a:endParaRPr b="0" lang="es-ES" sz="2800" spc="-1" strike="noStrike">
+            <a:endParaRPr b="0" lang="es-ES" sz="1800" spc="-1" strike="noStrike">
               <a:solidFill>
                 <a:srgbClr val="000000"/>
               </a:solidFill>
@@ -1641,7 +1641,7 @@
               <a:buChar char=""/>
             </a:pPr>
             <a:r>
-              <a:rPr b="0" lang="es-ES" sz="2400" spc="-1" strike="noStrike">
+              <a:rPr b="0" lang="es-ES" sz="1800" spc="-1" strike="noStrike">
                 <a:solidFill>
                   <a:srgbClr val="000000"/>
                 </a:solidFill>
@@ -1654,7 +1654,7 @@
               </a:rPr>
               <a:t>Tercer nivel del esquema</a:t>
             </a:r>
-            <a:endParaRPr b="0" lang="es-ES" sz="2400" spc="-1" strike="noStrike">
+            <a:endParaRPr b="0" lang="es-ES" sz="1800" spc="-1" strike="noStrike">
               <a:solidFill>
                 <a:srgbClr val="000000"/>
               </a:solidFill>
@@ -1676,7 +1676,7 @@
               <a:buChar char=""/>
             </a:pPr>
             <a:r>
-              <a:rPr b="0" lang="es-ES" sz="2000" spc="-1" strike="noStrike">
+              <a:rPr b="0" lang="es-ES" sz="1800" spc="-1" strike="noStrike">
                 <a:solidFill>
                   <a:srgbClr val="000000"/>
                 </a:solidFill>
@@ -1689,7 +1689,7 @@
               </a:rPr>
               <a:t>Cuarto nivel del esquema</a:t>
             </a:r>
-            <a:endParaRPr b="0" lang="es-ES" sz="2000" spc="-1" strike="noStrike">
+            <a:endParaRPr b="0" lang="es-ES" sz="1800" spc="-1" strike="noStrike">
               <a:solidFill>
                 <a:srgbClr val="000000"/>
               </a:solidFill>
@@ -1711,7 +1711,7 @@
               <a:buChar char=""/>
             </a:pPr>
             <a:r>
-              <a:rPr b="0" lang="es-ES" sz="2000" spc="-1" strike="noStrike">
+              <a:rPr b="0" lang="es-ES" sz="1800" spc="-1" strike="noStrike">
                 <a:solidFill>
                   <a:srgbClr val="000000"/>
                 </a:solidFill>
@@ -1724,7 +1724,7 @@
               </a:rPr>
               <a:t>Quinto nivel del esquema</a:t>
             </a:r>
-            <a:endParaRPr b="0" lang="es-ES" sz="2000" spc="-1" strike="noStrike">
+            <a:endParaRPr b="0" lang="es-ES" sz="1800" spc="-1" strike="noStrike">
               <a:solidFill>
                 <a:srgbClr val="000000"/>
               </a:solidFill>
@@ -1746,7 +1746,7 @@
               <a:buChar char=""/>
             </a:pPr>
             <a:r>
-              <a:rPr b="0" lang="es-ES" sz="2000" spc="-1" strike="noStrike">
+              <a:rPr b="0" lang="es-ES" sz="1800" spc="-1" strike="noStrike">
                 <a:solidFill>
                   <a:srgbClr val="000000"/>
                 </a:solidFill>
@@ -1759,7 +1759,7 @@
               </a:rPr>
               <a:t>Sexto nivel del esquema</a:t>
             </a:r>
-            <a:endParaRPr b="0" lang="es-ES" sz="2000" spc="-1" strike="noStrike">
+            <a:endParaRPr b="0" lang="es-ES" sz="1800" spc="-1" strike="noStrike">
               <a:solidFill>
                 <a:srgbClr val="000000"/>
               </a:solidFill>
@@ -1781,7 +1781,7 @@
               <a:buChar char=""/>
             </a:pPr>
             <a:r>
-              <a:rPr b="0" lang="es-ES" sz="2000" spc="-1" strike="noStrike">
+              <a:rPr b="0" lang="es-ES" sz="1800" spc="-1" strike="noStrike">
                 <a:solidFill>
                   <a:srgbClr val="000000"/>
                 </a:solidFill>
@@ -1794,7 +1794,7 @@
               </a:rPr>
               <a:t>Séptimo nivel del esquema</a:t>
             </a:r>
-            <a:endParaRPr b="0" lang="es-ES" sz="2000" spc="-1" strike="noStrike">
+            <a:endParaRPr b="0" lang="es-ES" sz="1800" spc="-1" strike="noStrike">
               <a:solidFill>
                 <a:srgbClr val="000000"/>
               </a:solidFill>
@@ -1854,7 +1854,7 @@
         <p:spPr>
           <a:xfrm>
             <a:off x="576000" y="2664000"/>
-            <a:ext cx="1151640" cy="4103640"/>
+            <a:ext cx="1151280" cy="4103280"/>
           </a:xfrm>
           <a:prstGeom prst="rect">
             <a:avLst/>
@@ -1952,8 +1952,8 @@
         </p:nvSpPr>
         <p:spPr>
           <a:xfrm>
-            <a:off x="3168000" y="2520000"/>
-            <a:ext cx="3023640" cy="575640"/>
+            <a:off x="3168000" y="2484000"/>
+            <a:ext cx="3023280" cy="542880"/>
           </a:xfrm>
           <a:prstGeom prst="rect">
             <a:avLst/>
@@ -2018,8 +2018,8 @@
         </p:nvSpPr>
         <p:spPr>
           <a:xfrm>
-            <a:off x="7344000" y="2376000"/>
-            <a:ext cx="2159640" cy="719640"/>
+            <a:off x="7344000" y="2347920"/>
+            <a:ext cx="2159280" cy="678960"/>
           </a:xfrm>
           <a:prstGeom prst="ellipse">
             <a:avLst/>
@@ -2117,8 +2117,8 @@
         </p:nvSpPr>
         <p:spPr>
           <a:xfrm>
-            <a:off x="3168000" y="3960000"/>
-            <a:ext cx="3023640" cy="503640"/>
+            <a:off x="3168000" y="3843360"/>
+            <a:ext cx="3023280" cy="475200"/>
           </a:xfrm>
           <a:prstGeom prst="rect">
             <a:avLst/>
@@ -2183,8 +2183,8 @@
         </p:nvSpPr>
         <p:spPr>
           <a:xfrm>
-            <a:off x="3168000" y="5040000"/>
-            <a:ext cx="3023640" cy="503640"/>
+            <a:off x="3168000" y="4863240"/>
+            <a:ext cx="3023280" cy="475200"/>
           </a:xfrm>
           <a:prstGeom prst="rect">
             <a:avLst/>
@@ -2249,8 +2249,8 @@
         </p:nvSpPr>
         <p:spPr>
           <a:xfrm>
-            <a:off x="3168000" y="6192000"/>
-            <a:ext cx="3023640" cy="503640"/>
+            <a:off x="3168000" y="5951160"/>
+            <a:ext cx="3023280" cy="475200"/>
           </a:xfrm>
           <a:prstGeom prst="rect">
             <a:avLst/>
@@ -2315,8 +2315,8 @@
         </p:nvSpPr>
         <p:spPr>
           <a:xfrm>
-            <a:off x="7416000" y="5904000"/>
-            <a:ext cx="2231640" cy="1007640"/>
+            <a:off x="7416000" y="5679000"/>
+            <a:ext cx="2231280" cy="951120"/>
           </a:xfrm>
           <a:prstGeom prst="ellipse">
             <a:avLst/>
@@ -2381,7 +2381,7 @@
         </p:nvSpPr>
         <p:spPr>
           <a:xfrm flipH="1">
-            <a:off x="6192000" y="2952000"/>
+            <a:off x="6192000" y="2891880"/>
             <a:ext cx="1368000" cy="360"/>
           </a:xfrm>
           <a:prstGeom prst="line">
@@ -2448,8 +2448,8 @@
         </p:nvSpPr>
         <p:spPr>
           <a:xfrm>
-            <a:off x="3816000" y="3096000"/>
-            <a:ext cx="360" cy="864000"/>
+            <a:off x="3816000" y="3027600"/>
+            <a:ext cx="360" cy="815760"/>
           </a:xfrm>
           <a:prstGeom prst="line">
             <a:avLst/>
@@ -2476,7 +2476,7 @@
         </p:nvSpPr>
         <p:spPr>
           <a:xfrm flipH="1">
-            <a:off x="1728000" y="4032000"/>
+            <a:off x="1728000" y="3911400"/>
             <a:ext cx="1440000" cy="360"/>
           </a:xfrm>
           <a:prstGeom prst="line">
@@ -2504,8 +2504,8 @@
         </p:nvSpPr>
         <p:spPr>
           <a:xfrm>
-            <a:off x="1728000" y="4392000"/>
-            <a:ext cx="1440000" cy="360"/>
+            <a:off x="1728000" y="4251600"/>
+            <a:ext cx="1440000" cy="0"/>
           </a:xfrm>
           <a:prstGeom prst="line">
             <a:avLst/>
@@ -2532,8 +2532,8 @@
         </p:nvSpPr>
         <p:spPr>
           <a:xfrm>
-            <a:off x="4248000" y="4464000"/>
-            <a:ext cx="360" cy="576000"/>
+            <a:off x="4248000" y="4319280"/>
+            <a:ext cx="360" cy="543960"/>
           </a:xfrm>
           <a:prstGeom prst="line">
             <a:avLst/>
@@ -2560,8 +2560,8 @@
         </p:nvSpPr>
         <p:spPr>
           <a:xfrm>
-            <a:off x="4248000" y="5544000"/>
-            <a:ext cx="360" cy="648000"/>
+            <a:off x="4248000" y="5339160"/>
+            <a:ext cx="360" cy="612000"/>
           </a:xfrm>
           <a:prstGeom prst="line">
             <a:avLst/>
@@ -2588,8 +2588,8 @@
         </p:nvSpPr>
         <p:spPr>
           <a:xfrm flipV="1">
-            <a:off x="5112000" y="5544000"/>
-            <a:ext cx="360" cy="648000"/>
+            <a:off x="5112000" y="5339160"/>
+            <a:ext cx="360" cy="612000"/>
           </a:xfrm>
           <a:prstGeom prst="line">
             <a:avLst/>
@@ -2616,7 +2616,7 @@
         </p:nvSpPr>
         <p:spPr>
           <a:xfrm>
-            <a:off x="6192000" y="6552000"/>
+            <a:off x="6192000" y="6291000"/>
             <a:ext cx="1296000" cy="360"/>
           </a:xfrm>
           <a:prstGeom prst="line">
@@ -2644,7 +2644,7 @@
         </p:nvSpPr>
         <p:spPr>
           <a:xfrm flipH="1">
-            <a:off x="6192000" y="6264000"/>
+            <a:off x="6192000" y="6018840"/>
             <a:ext cx="1224000" cy="360"/>
           </a:xfrm>
           <a:prstGeom prst="line">
@@ -2672,7 +2672,7 @@
         </p:nvSpPr>
         <p:spPr>
           <a:xfrm>
-            <a:off x="6192000" y="2592000"/>
+            <a:off x="6192000" y="2551680"/>
             <a:ext cx="1224000" cy="360"/>
           </a:xfrm>
           <a:prstGeom prst="line">
@@ -2700,8 +2700,8 @@
         </p:nvSpPr>
         <p:spPr>
           <a:xfrm>
-            <a:off x="6192000" y="2232000"/>
-            <a:ext cx="1295640" cy="359640"/>
+            <a:off x="6192000" y="2211840"/>
+            <a:ext cx="1295280" cy="339480"/>
           </a:xfrm>
           <a:prstGeom prst="rect">
             <a:avLst/>
@@ -2722,6 +2722,598 @@
           <a:p>
             <a:r>
               <a:rPr b="0" lang="es-ES" sz="1500" spc="-1" strike="noStrike">
+                <a:solidFill>
+                  <a:srgbClr val="000000"/>
+                </a:solidFill>
+                <a:uFill>
+                  <a:solidFill>
+                    <a:srgbClr val="ffffff"/>
+                  </a:solidFill>
+                </a:uFill>
+                <a:latin typeface="Arial"/>
+                <a:ea typeface="DejaVu Sans"/>
+              </a:rPr>
+              <a:t>1.1 Audio</a:t>
+            </a:r>
+            <a:endParaRPr b="0" lang="es-ES" sz="1800" spc="-1" strike="noStrike">
+              <a:solidFill>
+                <a:srgbClr val="000000"/>
+              </a:solidFill>
+              <a:uFill>
+                <a:solidFill>
+                  <a:srgbClr val="ffffff"/>
+                </a:solidFill>
+              </a:uFill>
+              <a:latin typeface="Arial"/>
+            </a:endParaRPr>
+          </a:p>
+        </p:txBody>
+      </p:sp>
+      <p:sp>
+        <p:nvSpPr>
+          <p:cNvPr id="54" name="CustomShape 19"/>
+          <p:cNvSpPr/>
+          <p:nvPr/>
+        </p:nvSpPr>
+        <p:spPr>
+          <a:xfrm>
+            <a:off x="6192000" y="3018600"/>
+            <a:ext cx="1655280" cy="484200"/>
+          </a:xfrm>
+          <a:prstGeom prst="rect">
+            <a:avLst/>
+          </a:prstGeom>
+          <a:noFill/>
+          <a:ln>
+            <a:noFill/>
+          </a:ln>
+        </p:spPr>
+        <p:style>
+          <a:lnRef idx="0"/>
+          <a:fillRef idx="0"/>
+          <a:effectRef idx="0"/>
+          <a:fontRef idx="minor"/>
+        </p:style>
+        <p:txBody>
+          <a:bodyPr lIns="90000" rIns="90000" tIns="45000" bIns="45000"/>
+          <a:p>
+            <a:r>
+              <a:rPr b="0" lang="es-ES" sz="1500" spc="-1" strike="noStrike">
+                <a:solidFill>
+                  <a:srgbClr val="000000"/>
+                </a:solidFill>
+                <a:uFill>
+                  <a:solidFill>
+                    <a:srgbClr val="ffffff"/>
+                  </a:solidFill>
+                </a:uFill>
+                <a:latin typeface="Arial"/>
+                <a:ea typeface="DejaVu Sans"/>
+              </a:rPr>
+              <a:t>1.2 Transcription dictionary</a:t>
+            </a:r>
+            <a:endParaRPr b="0" lang="es-ES" sz="1800" spc="-1" strike="noStrike">
+              <a:solidFill>
+                <a:srgbClr val="000000"/>
+              </a:solidFill>
+              <a:uFill>
+                <a:solidFill>
+                  <a:srgbClr val="ffffff"/>
+                </a:solidFill>
+              </a:uFill>
+              <a:latin typeface="Arial"/>
+            </a:endParaRPr>
+          </a:p>
+        </p:txBody>
+      </p:sp>
+      <p:sp>
+        <p:nvSpPr>
+          <p:cNvPr id="55" name="CustomShape 20"/>
+          <p:cNvSpPr/>
+          <p:nvPr/>
+        </p:nvSpPr>
+        <p:spPr>
+          <a:xfrm>
+            <a:off x="3888000" y="3090600"/>
+            <a:ext cx="1655280" cy="684360"/>
+          </a:xfrm>
+          <a:prstGeom prst="rect">
+            <a:avLst/>
+          </a:prstGeom>
+          <a:noFill/>
+          <a:ln>
+            <a:noFill/>
+          </a:ln>
+        </p:spPr>
+        <p:style>
+          <a:lnRef idx="0"/>
+          <a:fillRef idx="0"/>
+          <a:effectRef idx="0"/>
+          <a:fontRef idx="minor"/>
+        </p:style>
+        <p:txBody>
+          <a:bodyPr lIns="90000" rIns="90000" tIns="45000" bIns="45000"/>
+          <a:p>
+            <a:r>
+              <a:rPr b="0" lang="es-ES" sz="1500" spc="-1" strike="noStrike">
+                <a:solidFill>
+                  <a:srgbClr val="000000"/>
+                </a:solidFill>
+                <a:uFill>
+                  <a:solidFill>
+                    <a:srgbClr val="ffffff"/>
+                  </a:solidFill>
+                </a:uFill>
+                <a:latin typeface="Arial"/>
+                <a:ea typeface="DejaVu Sans"/>
+              </a:rPr>
+              <a:t>2. Transcription hypotheses dictionary</a:t>
+            </a:r>
+            <a:endParaRPr b="0" lang="es-ES" sz="1800" spc="-1" strike="noStrike">
+              <a:solidFill>
+                <a:srgbClr val="000000"/>
+              </a:solidFill>
+              <a:uFill>
+                <a:solidFill>
+                  <a:srgbClr val="ffffff"/>
+                </a:solidFill>
+              </a:uFill>
+              <a:latin typeface="Arial"/>
+            </a:endParaRPr>
+          </a:p>
+        </p:txBody>
+      </p:sp>
+      <p:sp>
+        <p:nvSpPr>
+          <p:cNvPr id="56" name="CustomShape 21"/>
+          <p:cNvSpPr/>
+          <p:nvPr/>
+        </p:nvSpPr>
+        <p:spPr>
+          <a:xfrm>
+            <a:off x="4320000" y="4442040"/>
+            <a:ext cx="1943280" cy="284760"/>
+          </a:xfrm>
+          <a:prstGeom prst="rect">
+            <a:avLst/>
+          </a:prstGeom>
+          <a:noFill/>
+          <a:ln>
+            <a:noFill/>
+          </a:ln>
+        </p:spPr>
+        <p:style>
+          <a:lnRef idx="0"/>
+          <a:fillRef idx="0"/>
+          <a:effectRef idx="0"/>
+          <a:fontRef idx="minor"/>
+        </p:style>
+        <p:txBody>
+          <a:bodyPr lIns="90000" rIns="90000" tIns="45000" bIns="45000"/>
+          <a:p>
+            <a:r>
+              <a:rPr b="0" lang="es-ES" sz="1500" spc="-1" strike="noStrike">
+                <a:solidFill>
+                  <a:srgbClr val="000000"/>
+                </a:solidFill>
+                <a:uFill>
+                  <a:solidFill>
+                    <a:srgbClr val="ffffff"/>
+                  </a:solidFill>
+                </a:uFill>
+                <a:latin typeface="Arial"/>
+                <a:ea typeface="DejaVu Sans"/>
+              </a:rPr>
+              <a:t>4. CFR String </a:t>
+            </a:r>
+            <a:endParaRPr b="0" lang="es-ES" sz="1800" spc="-1" strike="noStrike">
+              <a:solidFill>
+                <a:srgbClr val="000000"/>
+              </a:solidFill>
+              <a:uFill>
+                <a:solidFill>
+                  <a:srgbClr val="ffffff"/>
+                </a:solidFill>
+              </a:uFill>
+              <a:latin typeface="Arial"/>
+            </a:endParaRPr>
+          </a:p>
+        </p:txBody>
+      </p:sp>
+      <p:sp>
+        <p:nvSpPr>
+          <p:cNvPr id="57" name="CustomShape 22"/>
+          <p:cNvSpPr/>
+          <p:nvPr/>
+        </p:nvSpPr>
+        <p:spPr>
+          <a:xfrm>
+            <a:off x="1728000" y="3371760"/>
+            <a:ext cx="1943280" cy="538920"/>
+          </a:xfrm>
+          <a:prstGeom prst="rect">
+            <a:avLst/>
+          </a:prstGeom>
+          <a:noFill/>
+          <a:ln>
+            <a:noFill/>
+          </a:ln>
+        </p:spPr>
+        <p:style>
+          <a:lnRef idx="0"/>
+          <a:fillRef idx="0"/>
+          <a:effectRef idx="0"/>
+          <a:fontRef idx="minor"/>
+        </p:style>
+        <p:txBody>
+          <a:bodyPr lIns="90000" rIns="90000" tIns="45000" bIns="45000"/>
+          <a:p>
+            <a:r>
+              <a:rPr b="0" lang="es-ES" sz="1500" spc="-1" strike="noStrike">
+                <a:solidFill>
+                  <a:srgbClr val="000000"/>
+                </a:solidFill>
+                <a:uFill>
+                  <a:solidFill>
+                    <a:srgbClr val="ffffff"/>
+                  </a:solidFill>
+                </a:uFill>
+                <a:latin typeface="Arial"/>
+                <a:ea typeface="DejaVu Sans"/>
+              </a:rPr>
+              <a:t>3.1. Hypothesis + entities</a:t>
+            </a:r>
+            <a:endParaRPr b="0" lang="es-ES" sz="1800" spc="-1" strike="noStrike">
+              <a:solidFill>
+                <a:srgbClr val="000000"/>
+              </a:solidFill>
+              <a:uFill>
+                <a:solidFill>
+                  <a:srgbClr val="ffffff"/>
+                </a:solidFill>
+              </a:uFill>
+              <a:latin typeface="Arial"/>
+            </a:endParaRPr>
+          </a:p>
+        </p:txBody>
+      </p:sp>
+      <p:sp>
+        <p:nvSpPr>
+          <p:cNvPr id="58" name="CustomShape 23"/>
+          <p:cNvSpPr/>
+          <p:nvPr/>
+        </p:nvSpPr>
+        <p:spPr>
+          <a:xfrm>
+            <a:off x="1728000" y="4255560"/>
+            <a:ext cx="1943280" cy="471240"/>
+          </a:xfrm>
+          <a:prstGeom prst="rect">
+            <a:avLst/>
+          </a:prstGeom>
+          <a:noFill/>
+          <a:ln>
+            <a:noFill/>
+          </a:ln>
+        </p:spPr>
+        <p:style>
+          <a:lnRef idx="0"/>
+          <a:fillRef idx="0"/>
+          <a:effectRef idx="0"/>
+          <a:fontRef idx="minor"/>
+        </p:style>
+        <p:txBody>
+          <a:bodyPr lIns="90000" rIns="90000" tIns="45000" bIns="45000"/>
+          <a:p>
+            <a:r>
+              <a:rPr b="0" lang="es-ES" sz="1500" spc="-1" strike="noStrike">
+                <a:solidFill>
+                  <a:srgbClr val="000000"/>
+                </a:solidFill>
+                <a:uFill>
+                  <a:solidFill>
+                    <a:srgbClr val="ffffff"/>
+                  </a:solidFill>
+                </a:uFill>
+                <a:latin typeface="Arial"/>
+                <a:ea typeface="DejaVu Sans"/>
+              </a:rPr>
+              <a:t>3.2. CFR String</a:t>
+            </a:r>
+            <a:endParaRPr b="0" lang="es-ES" sz="1800" spc="-1" strike="noStrike">
+              <a:solidFill>
+                <a:srgbClr val="000000"/>
+              </a:solidFill>
+              <a:uFill>
+                <a:solidFill>
+                  <a:srgbClr val="ffffff"/>
+                </a:solidFill>
+              </a:uFill>
+              <a:latin typeface="Arial"/>
+            </a:endParaRPr>
+          </a:p>
+        </p:txBody>
+      </p:sp>
+      <p:sp>
+        <p:nvSpPr>
+          <p:cNvPr id="59" name="CustomShape 24"/>
+          <p:cNvSpPr/>
+          <p:nvPr/>
+        </p:nvSpPr>
+        <p:spPr>
+          <a:xfrm>
+            <a:off x="2952000" y="5407200"/>
+            <a:ext cx="1943280" cy="484200"/>
+          </a:xfrm>
+          <a:prstGeom prst="rect">
+            <a:avLst/>
+          </a:prstGeom>
+          <a:noFill/>
+          <a:ln>
+            <a:noFill/>
+          </a:ln>
+        </p:spPr>
+        <p:style>
+          <a:lnRef idx="0"/>
+          <a:fillRef idx="0"/>
+          <a:effectRef idx="0"/>
+          <a:fontRef idx="minor"/>
+        </p:style>
+        <p:txBody>
+          <a:bodyPr lIns="90000" rIns="90000" tIns="45000" bIns="45000"/>
+          <a:p>
+            <a:r>
+              <a:rPr b="0" lang="es-ES" sz="1500" spc="-1" strike="noStrike">
+                <a:solidFill>
+                  <a:srgbClr val="000000"/>
+                </a:solidFill>
+                <a:uFill>
+                  <a:solidFill>
+                    <a:srgbClr val="ffffff"/>
+                  </a:solidFill>
+                </a:uFill>
+                <a:latin typeface="Arial"/>
+                <a:ea typeface="DejaVu Sans"/>
+              </a:rPr>
+              <a:t>5.1 Goals / Commands</a:t>
+            </a:r>
+            <a:endParaRPr b="0" lang="es-ES" sz="1800" spc="-1" strike="noStrike">
+              <a:solidFill>
+                <a:srgbClr val="000000"/>
+              </a:solidFill>
+              <a:uFill>
+                <a:solidFill>
+                  <a:srgbClr val="ffffff"/>
+                </a:solidFill>
+              </a:uFill>
+              <a:latin typeface="Arial"/>
+            </a:endParaRPr>
+          </a:p>
+        </p:txBody>
+      </p:sp>
+      <p:sp>
+        <p:nvSpPr>
+          <p:cNvPr id="60" name="CustomShape 25"/>
+          <p:cNvSpPr/>
+          <p:nvPr/>
+        </p:nvSpPr>
+        <p:spPr>
+          <a:xfrm>
+            <a:off x="5184000" y="5475240"/>
+            <a:ext cx="1223280" cy="339120"/>
+          </a:xfrm>
+          <a:prstGeom prst="rect">
+            <a:avLst/>
+          </a:prstGeom>
+          <a:noFill/>
+          <a:ln>
+            <a:noFill/>
+          </a:ln>
+        </p:spPr>
+        <p:style>
+          <a:lnRef idx="0"/>
+          <a:fillRef idx="0"/>
+          <a:effectRef idx="0"/>
+          <a:fontRef idx="minor"/>
+        </p:style>
+        <p:txBody>
+          <a:bodyPr lIns="90000" rIns="90000" tIns="45000" bIns="45000"/>
+          <a:p>
+            <a:r>
+              <a:rPr b="0" lang="es-ES" sz="1500" spc="-1" strike="noStrike">
+                <a:solidFill>
+                  <a:srgbClr val="000000"/>
+                </a:solidFill>
+                <a:uFill>
+                  <a:solidFill>
+                    <a:srgbClr val="ffffff"/>
+                  </a:solidFill>
+                </a:uFill>
+                <a:latin typeface="Arial"/>
+                <a:ea typeface="DejaVu Sans"/>
+              </a:rPr>
+              <a:t>5.2 State</a:t>
+            </a:r>
+            <a:endParaRPr b="0" lang="es-ES" sz="1800" spc="-1" strike="noStrike">
+              <a:solidFill>
+                <a:srgbClr val="000000"/>
+              </a:solidFill>
+              <a:uFill>
+                <a:solidFill>
+                  <a:srgbClr val="ffffff"/>
+                </a:solidFill>
+              </a:uFill>
+              <a:latin typeface="Arial"/>
+            </a:endParaRPr>
+          </a:p>
+        </p:txBody>
+      </p:sp>
+      <p:sp>
+        <p:nvSpPr>
+          <p:cNvPr id="61" name="CustomShape 26"/>
+          <p:cNvSpPr/>
+          <p:nvPr/>
+        </p:nvSpPr>
+        <p:spPr>
+          <a:xfrm>
+            <a:off x="6192000" y="6426720"/>
+            <a:ext cx="1511280" cy="484560"/>
+          </a:xfrm>
+          <a:prstGeom prst="rect">
+            <a:avLst/>
+          </a:prstGeom>
+          <a:noFill/>
+          <a:ln>
+            <a:noFill/>
+          </a:ln>
+        </p:spPr>
+        <p:style>
+          <a:lnRef idx="0"/>
+          <a:fillRef idx="0"/>
+          <a:effectRef idx="0"/>
+          <a:fontRef idx="minor"/>
+        </p:style>
+        <p:txBody>
+          <a:bodyPr lIns="90000" rIns="90000" tIns="45000" bIns="45000"/>
+          <a:p>
+            <a:r>
+              <a:rPr b="0" lang="es-ES" sz="1500" spc="-1" strike="noStrike">
+                <a:solidFill>
+                  <a:srgbClr val="000000"/>
+                </a:solidFill>
+                <a:uFill>
+                  <a:solidFill>
+                    <a:srgbClr val="ffffff"/>
+                  </a:solidFill>
+                </a:uFill>
+                <a:latin typeface="Arial"/>
+                <a:ea typeface="DejaVu Sans"/>
+              </a:rPr>
+              <a:t>6.1 Commands</a:t>
+            </a:r>
+            <a:endParaRPr b="0" lang="es-ES" sz="1800" spc="-1" strike="noStrike">
+              <a:solidFill>
+                <a:srgbClr val="000000"/>
+              </a:solidFill>
+              <a:uFill>
+                <a:solidFill>
+                  <a:srgbClr val="ffffff"/>
+                </a:solidFill>
+              </a:uFill>
+              <a:latin typeface="Arial"/>
+            </a:endParaRPr>
+          </a:p>
+        </p:txBody>
+      </p:sp>
+      <p:sp>
+        <p:nvSpPr>
+          <p:cNvPr id="62" name="CustomShape 27"/>
+          <p:cNvSpPr/>
+          <p:nvPr/>
+        </p:nvSpPr>
+        <p:spPr>
+          <a:xfrm>
+            <a:off x="6192000" y="5679000"/>
+            <a:ext cx="1223280" cy="339480"/>
+          </a:xfrm>
+          <a:prstGeom prst="rect">
+            <a:avLst/>
+          </a:prstGeom>
+          <a:noFill/>
+          <a:ln>
+            <a:noFill/>
+          </a:ln>
+        </p:spPr>
+        <p:style>
+          <a:lnRef idx="0"/>
+          <a:fillRef idx="0"/>
+          <a:effectRef idx="0"/>
+          <a:fontRef idx="minor"/>
+        </p:style>
+        <p:txBody>
+          <a:bodyPr lIns="90000" rIns="90000" tIns="45000" bIns="45000"/>
+          <a:p>
+            <a:r>
+              <a:rPr b="0" lang="es-ES" sz="1500" spc="-1" strike="noStrike">
+                <a:solidFill>
+                  <a:srgbClr val="000000"/>
+                </a:solidFill>
+                <a:uFill>
+                  <a:solidFill>
+                    <a:srgbClr val="ffffff"/>
+                  </a:solidFill>
+                </a:uFill>
+                <a:latin typeface="Arial"/>
+                <a:ea typeface="DejaVu Sans"/>
+              </a:rPr>
+              <a:t>6.2 State</a:t>
+            </a:r>
+            <a:endParaRPr b="0" lang="es-ES" sz="1800" spc="-1" strike="noStrike">
+              <a:solidFill>
+                <a:srgbClr val="000000"/>
+              </a:solidFill>
+              <a:uFill>
+                <a:solidFill>
+                  <a:srgbClr val="ffffff"/>
+                </a:solidFill>
+              </a:uFill>
+              <a:latin typeface="Arial"/>
+            </a:endParaRPr>
+          </a:p>
+        </p:txBody>
+      </p:sp>
+      <p:sp>
+        <p:nvSpPr>
+          <p:cNvPr id="63" name="Line 28"/>
+          <p:cNvSpPr/>
+          <p:nvPr/>
+        </p:nvSpPr>
+        <p:spPr>
+          <a:xfrm>
+            <a:off x="3816000" y="1872000"/>
+            <a:ext cx="0" cy="612000"/>
+          </a:xfrm>
+          <a:prstGeom prst="line">
+            <a:avLst/>
+          </a:prstGeom>
+          <a:ln>
+            <a:solidFill>
+              <a:srgbClr val="000000"/>
+            </a:solidFill>
+            <a:tailEnd len="med" type="triangle" w="med"/>
+          </a:ln>
+        </p:spPr>
+        <p:style>
+          <a:lnRef idx="0"/>
+          <a:fillRef idx="0"/>
+          <a:effectRef idx="0"/>
+          <a:fontRef idx="minor"/>
+        </p:style>
+      </p:sp>
+      <p:sp>
+        <p:nvSpPr>
+          <p:cNvPr id="64" name="TextShape 29"/>
+          <p:cNvSpPr txBox="1"/>
+          <p:nvPr/>
+        </p:nvSpPr>
+        <p:spPr>
+          <a:xfrm>
+            <a:off x="3816000" y="1940040"/>
+            <a:ext cx="1224000" cy="316080"/>
+          </a:xfrm>
+          <a:prstGeom prst="rect">
+            <a:avLst/>
+          </a:prstGeom>
+          <a:noFill/>
+          <a:ln>
+            <a:noFill/>
+          </a:ln>
+        </p:spPr>
+        <p:txBody>
+          <a:bodyPr lIns="90000" rIns="90000" tIns="45000" bIns="45000"/>
+          <a:p>
+            <a:r>
+              <a:rPr b="0" lang="es-ES" sz="1600" spc="-1" strike="noStrike">
                 <a:solidFill>
                   <a:srgbClr val="000000"/>
                 </a:solidFill>
@@ -2732,7 +3324,7 @@
                 </a:uFill>
                 <a:latin typeface="Arial"/>
               </a:rPr>
-              <a:t>1.1 Audio</a:t>
+              <a:t>Voice</a:t>
             </a:r>
             <a:endParaRPr b="0" lang="es-ES" sz="1800" spc="-1" strike="noStrike">
               <a:solidFill>
@@ -2750,21 +3342,23 @@
       </p:sp>
       <p:sp>
         <p:nvSpPr>
-          <p:cNvPr id="54" name="CustomShape 19"/>
+          <p:cNvPr id="65" name="Line 30"/>
           <p:cNvSpPr/>
           <p:nvPr/>
         </p:nvSpPr>
         <p:spPr>
           <a:xfrm>
-            <a:off x="6192000" y="3086280"/>
-            <a:ext cx="1655640" cy="513360"/>
-          </a:xfrm>
-          <a:prstGeom prst="rect">
-            <a:avLst/>
-          </a:prstGeom>
-          <a:noFill/>
+            <a:off x="9288000" y="6480000"/>
+            <a:ext cx="0" cy="720000"/>
+          </a:xfrm>
+          <a:prstGeom prst="line">
+            <a:avLst/>
+          </a:prstGeom>
           <a:ln>
-            <a:noFill/>
+            <a:solidFill>
+              <a:srgbClr val="000000"/>
+            </a:solidFill>
+            <a:tailEnd len="med" type="triangle" w="med"/>
           </a:ln>
         </p:spPr>
         <p:style>
@@ -2773,6 +3367,26 @@
           <a:effectRef idx="0"/>
           <a:fontRef idx="minor"/>
         </p:style>
+      </p:sp>
+      <p:sp>
+        <p:nvSpPr>
+          <p:cNvPr id="66" name="TextShape 31"/>
+          <p:cNvSpPr txBox="1"/>
+          <p:nvPr/>
+        </p:nvSpPr>
+        <p:spPr>
+          <a:xfrm>
+            <a:off x="8136000" y="6696000"/>
+            <a:ext cx="1368000" cy="602280"/>
+          </a:xfrm>
+          <a:prstGeom prst="rect">
+            <a:avLst/>
+          </a:prstGeom>
+          <a:noFill/>
+          <a:ln>
+            <a:noFill/>
+          </a:ln>
+        </p:spPr>
         <p:txBody>
           <a:bodyPr lIns="90000" rIns="90000" tIns="45000" bIns="45000"/>
           <a:p>
@@ -2788,457 +3402,9 @@
                 </a:uFill>
                 <a:latin typeface="Arial"/>
               </a:rPr>
-              <a:t>1.2 Transcription dictionary</a:t>
+              <a:t>Movements</a:t>
             </a:r>
-            <a:endParaRPr b="0" lang="es-ES" sz="1800" spc="-1" strike="noStrike">
-              <a:solidFill>
-                <a:srgbClr val="000000"/>
-              </a:solidFill>
-              <a:uFill>
-                <a:solidFill>
-                  <a:srgbClr val="ffffff"/>
-                </a:solidFill>
-              </a:uFill>
-              <a:latin typeface="Arial"/>
-            </a:endParaRPr>
-          </a:p>
-        </p:txBody>
-      </p:sp>
-      <p:sp>
-        <p:nvSpPr>
-          <p:cNvPr id="55" name="CustomShape 20"/>
-          <p:cNvSpPr/>
-          <p:nvPr/>
-        </p:nvSpPr>
-        <p:spPr>
-          <a:xfrm>
-            <a:off x="3888000" y="3162600"/>
-            <a:ext cx="1655640" cy="725040"/>
-          </a:xfrm>
-          <a:prstGeom prst="rect">
-            <a:avLst/>
-          </a:prstGeom>
-          <a:noFill/>
-          <a:ln>
-            <a:noFill/>
-          </a:ln>
-        </p:spPr>
-        <p:style>
-          <a:lnRef idx="0"/>
-          <a:fillRef idx="0"/>
-          <a:effectRef idx="0"/>
-          <a:fontRef idx="minor"/>
-        </p:style>
-        <p:txBody>
-          <a:bodyPr lIns="90000" rIns="90000" tIns="45000" bIns="45000"/>
-          <a:p>
-            <a:r>
-              <a:rPr b="0" lang="es-ES" sz="1500" spc="-1" strike="noStrike">
-                <a:solidFill>
-                  <a:srgbClr val="000000"/>
-                </a:solidFill>
-                <a:uFill>
-                  <a:solidFill>
-                    <a:srgbClr val="ffffff"/>
-                  </a:solidFill>
-                </a:uFill>
-                <a:latin typeface="Arial"/>
-              </a:rPr>
-              <a:t>2. Transcription hypotheses dictionary</a:t>
-            </a:r>
-            <a:endParaRPr b="0" lang="es-ES" sz="1800" spc="-1" strike="noStrike">
-              <a:solidFill>
-                <a:srgbClr val="000000"/>
-              </a:solidFill>
-              <a:uFill>
-                <a:solidFill>
-                  <a:srgbClr val="ffffff"/>
-                </a:solidFill>
-              </a:uFill>
-              <a:latin typeface="Arial"/>
-            </a:endParaRPr>
-          </a:p>
-        </p:txBody>
-      </p:sp>
-      <p:sp>
-        <p:nvSpPr>
-          <p:cNvPr id="56" name="CustomShape 21"/>
-          <p:cNvSpPr/>
-          <p:nvPr/>
-        </p:nvSpPr>
-        <p:spPr>
-          <a:xfrm>
-            <a:off x="4320000" y="4593960"/>
-            <a:ext cx="1943640" cy="301680"/>
-          </a:xfrm>
-          <a:prstGeom prst="rect">
-            <a:avLst/>
-          </a:prstGeom>
-          <a:noFill/>
-          <a:ln>
-            <a:noFill/>
-          </a:ln>
-        </p:spPr>
-        <p:style>
-          <a:lnRef idx="0"/>
-          <a:fillRef idx="0"/>
-          <a:effectRef idx="0"/>
-          <a:fontRef idx="minor"/>
-        </p:style>
-        <p:txBody>
-          <a:bodyPr lIns="90000" rIns="90000" tIns="45000" bIns="45000"/>
-          <a:p>
-            <a:r>
-              <a:rPr b="0" lang="es-ES" sz="1500" spc="-1" strike="noStrike">
-                <a:solidFill>
-                  <a:srgbClr val="000000"/>
-                </a:solidFill>
-                <a:uFill>
-                  <a:solidFill>
-                    <a:srgbClr val="ffffff"/>
-                  </a:solidFill>
-                </a:uFill>
-                <a:latin typeface="Arial"/>
-              </a:rPr>
-              <a:t>4. CFR String </a:t>
-            </a:r>
-            <a:endParaRPr b="0" lang="es-ES" sz="1800" spc="-1" strike="noStrike">
-              <a:solidFill>
-                <a:srgbClr val="000000"/>
-              </a:solidFill>
-              <a:uFill>
-                <a:solidFill>
-                  <a:srgbClr val="ffffff"/>
-                </a:solidFill>
-              </a:uFill>
-              <a:latin typeface="Arial"/>
-            </a:endParaRPr>
-          </a:p>
-        </p:txBody>
-      </p:sp>
-      <p:sp>
-        <p:nvSpPr>
-          <p:cNvPr id="57" name="CustomShape 22"/>
-          <p:cNvSpPr/>
-          <p:nvPr/>
-        </p:nvSpPr>
-        <p:spPr>
-          <a:xfrm>
-            <a:off x="1728000" y="3460320"/>
-            <a:ext cx="1943640" cy="571320"/>
-          </a:xfrm>
-          <a:prstGeom prst="rect">
-            <a:avLst/>
-          </a:prstGeom>
-          <a:noFill/>
-          <a:ln>
-            <a:noFill/>
-          </a:ln>
-        </p:spPr>
-        <p:style>
-          <a:lnRef idx="0"/>
-          <a:fillRef idx="0"/>
-          <a:effectRef idx="0"/>
-          <a:fontRef idx="minor"/>
-        </p:style>
-        <p:txBody>
-          <a:bodyPr lIns="90000" rIns="90000" tIns="45000" bIns="45000"/>
-          <a:p>
-            <a:r>
-              <a:rPr b="0" lang="es-ES" sz="1500" spc="-1" strike="noStrike">
-                <a:solidFill>
-                  <a:srgbClr val="000000"/>
-                </a:solidFill>
-                <a:uFill>
-                  <a:solidFill>
-                    <a:srgbClr val="ffffff"/>
-                  </a:solidFill>
-                </a:uFill>
-                <a:latin typeface="Arial"/>
-              </a:rPr>
-              <a:t>3.1. Hypothesis + entities</a:t>
-            </a:r>
-            <a:endParaRPr b="0" lang="es-ES" sz="1800" spc="-1" strike="noStrike">
-              <a:solidFill>
-                <a:srgbClr val="000000"/>
-              </a:solidFill>
-              <a:uFill>
-                <a:solidFill>
-                  <a:srgbClr val="ffffff"/>
-                </a:solidFill>
-              </a:uFill>
-              <a:latin typeface="Arial"/>
-            </a:endParaRPr>
-          </a:p>
-        </p:txBody>
-      </p:sp>
-      <p:sp>
-        <p:nvSpPr>
-          <p:cNvPr id="58" name="CustomShape 23"/>
-          <p:cNvSpPr/>
-          <p:nvPr/>
-        </p:nvSpPr>
-        <p:spPr>
-          <a:xfrm>
-            <a:off x="1728000" y="4396320"/>
-            <a:ext cx="1943640" cy="499320"/>
-          </a:xfrm>
-          <a:prstGeom prst="rect">
-            <a:avLst/>
-          </a:prstGeom>
-          <a:noFill/>
-          <a:ln>
-            <a:noFill/>
-          </a:ln>
-        </p:spPr>
-        <p:style>
-          <a:lnRef idx="0"/>
-          <a:fillRef idx="0"/>
-          <a:effectRef idx="0"/>
-          <a:fontRef idx="minor"/>
-        </p:style>
-        <p:txBody>
-          <a:bodyPr lIns="90000" rIns="90000" tIns="45000" bIns="45000"/>
-          <a:p>
-            <a:r>
-              <a:rPr b="0" lang="es-ES" sz="1500" spc="-1" strike="noStrike">
-                <a:solidFill>
-                  <a:srgbClr val="000000"/>
-                </a:solidFill>
-                <a:uFill>
-                  <a:solidFill>
-                    <a:srgbClr val="ffffff"/>
-                  </a:solidFill>
-                </a:uFill>
-                <a:latin typeface="Arial"/>
-              </a:rPr>
-              <a:t>3.2. CFR String</a:t>
-            </a:r>
-            <a:endParaRPr b="0" lang="es-ES" sz="1800" spc="-1" strike="noStrike">
-              <a:solidFill>
-                <a:srgbClr val="000000"/>
-              </a:solidFill>
-              <a:uFill>
-                <a:solidFill>
-                  <a:srgbClr val="ffffff"/>
-                </a:solidFill>
-              </a:uFill>
-              <a:latin typeface="Arial"/>
-            </a:endParaRPr>
-          </a:p>
-        </p:txBody>
-      </p:sp>
-      <p:sp>
-        <p:nvSpPr>
-          <p:cNvPr id="59" name="CustomShape 24"/>
-          <p:cNvSpPr/>
-          <p:nvPr/>
-        </p:nvSpPr>
-        <p:spPr>
-          <a:xfrm>
-            <a:off x="2952000" y="5616000"/>
-            <a:ext cx="1943640" cy="513360"/>
-          </a:xfrm>
-          <a:prstGeom prst="rect">
-            <a:avLst/>
-          </a:prstGeom>
-          <a:noFill/>
-          <a:ln>
-            <a:noFill/>
-          </a:ln>
-        </p:spPr>
-        <p:style>
-          <a:lnRef idx="0"/>
-          <a:fillRef idx="0"/>
-          <a:effectRef idx="0"/>
-          <a:fontRef idx="minor"/>
-        </p:style>
-        <p:txBody>
-          <a:bodyPr lIns="90000" rIns="90000" tIns="45000" bIns="45000"/>
-          <a:p>
-            <a:r>
-              <a:rPr b="0" lang="es-ES" sz="1500" spc="-1" strike="noStrike">
-                <a:solidFill>
-                  <a:srgbClr val="000000"/>
-                </a:solidFill>
-                <a:uFill>
-                  <a:solidFill>
-                    <a:srgbClr val="ffffff"/>
-                  </a:solidFill>
-                </a:uFill>
-                <a:latin typeface="Arial"/>
-              </a:rPr>
-              <a:t>5.1 Goals / Commands</a:t>
-            </a:r>
-            <a:endParaRPr b="0" lang="es-ES" sz="1800" spc="-1" strike="noStrike">
-              <a:solidFill>
-                <a:srgbClr val="000000"/>
-              </a:solidFill>
-              <a:uFill>
-                <a:solidFill>
-                  <a:srgbClr val="ffffff"/>
-                </a:solidFill>
-              </a:uFill>
-              <a:latin typeface="Arial"/>
-            </a:endParaRPr>
-          </a:p>
-        </p:txBody>
-      </p:sp>
-      <p:sp>
-        <p:nvSpPr>
-          <p:cNvPr id="60" name="CustomShape 25"/>
-          <p:cNvSpPr/>
-          <p:nvPr/>
-        </p:nvSpPr>
-        <p:spPr>
-          <a:xfrm>
-            <a:off x="5184000" y="5688000"/>
-            <a:ext cx="1223640" cy="359640"/>
-          </a:xfrm>
-          <a:prstGeom prst="rect">
-            <a:avLst/>
-          </a:prstGeom>
-          <a:noFill/>
-          <a:ln>
-            <a:noFill/>
-          </a:ln>
-        </p:spPr>
-        <p:style>
-          <a:lnRef idx="0"/>
-          <a:fillRef idx="0"/>
-          <a:effectRef idx="0"/>
-          <a:fontRef idx="minor"/>
-        </p:style>
-        <p:txBody>
-          <a:bodyPr lIns="90000" rIns="90000" tIns="45000" bIns="45000"/>
-          <a:p>
-            <a:r>
-              <a:rPr b="0" lang="es-ES" sz="1500" spc="-1" strike="noStrike">
-                <a:solidFill>
-                  <a:srgbClr val="000000"/>
-                </a:solidFill>
-                <a:uFill>
-                  <a:solidFill>
-                    <a:srgbClr val="ffffff"/>
-                  </a:solidFill>
-                </a:uFill>
-                <a:latin typeface="Arial"/>
-              </a:rPr>
-              <a:t>5.2 State</a:t>
-            </a:r>
-            <a:endParaRPr b="0" lang="es-ES" sz="1800" spc="-1" strike="noStrike">
-              <a:solidFill>
-                <a:srgbClr val="000000"/>
-              </a:solidFill>
-              <a:uFill>
-                <a:solidFill>
-                  <a:srgbClr val="ffffff"/>
-                </a:solidFill>
-              </a:uFill>
-              <a:latin typeface="Arial"/>
-            </a:endParaRPr>
-          </a:p>
-        </p:txBody>
-      </p:sp>
-      <p:sp>
-        <p:nvSpPr>
-          <p:cNvPr id="61" name="CustomShape 26"/>
-          <p:cNvSpPr/>
-          <p:nvPr/>
-        </p:nvSpPr>
-        <p:spPr>
-          <a:xfrm>
-            <a:off x="6192000" y="6696000"/>
-            <a:ext cx="1511640" cy="513360"/>
-          </a:xfrm>
-          <a:prstGeom prst="rect">
-            <a:avLst/>
-          </a:prstGeom>
-          <a:noFill/>
-          <a:ln>
-            <a:noFill/>
-          </a:ln>
-        </p:spPr>
-        <p:style>
-          <a:lnRef idx="0"/>
-          <a:fillRef idx="0"/>
-          <a:effectRef idx="0"/>
-          <a:fontRef idx="minor"/>
-        </p:style>
-        <p:txBody>
-          <a:bodyPr lIns="90000" rIns="90000" tIns="45000" bIns="45000"/>
-          <a:p>
-            <a:r>
-              <a:rPr b="0" lang="es-ES" sz="1500" spc="-1" strike="noStrike">
-                <a:solidFill>
-                  <a:srgbClr val="000000"/>
-                </a:solidFill>
-                <a:uFill>
-                  <a:solidFill>
-                    <a:srgbClr val="ffffff"/>
-                  </a:solidFill>
-                </a:uFill>
-                <a:latin typeface="Arial"/>
-              </a:rPr>
-              <a:t>6.1 Commands</a:t>
-            </a:r>
-            <a:endParaRPr b="0" lang="es-ES" sz="1800" spc="-1" strike="noStrike">
-              <a:solidFill>
-                <a:srgbClr val="000000"/>
-              </a:solidFill>
-              <a:uFill>
-                <a:solidFill>
-                  <a:srgbClr val="ffffff"/>
-                </a:solidFill>
-              </a:uFill>
-              <a:latin typeface="Arial"/>
-            </a:endParaRPr>
-          </a:p>
-        </p:txBody>
-      </p:sp>
-      <p:sp>
-        <p:nvSpPr>
-          <p:cNvPr id="62" name="CustomShape 27"/>
-          <p:cNvSpPr/>
-          <p:nvPr/>
-        </p:nvSpPr>
-        <p:spPr>
-          <a:xfrm>
-            <a:off x="6192000" y="5904000"/>
-            <a:ext cx="1223640" cy="359640"/>
-          </a:xfrm>
-          <a:prstGeom prst="rect">
-            <a:avLst/>
-          </a:prstGeom>
-          <a:noFill/>
-          <a:ln>
-            <a:noFill/>
-          </a:ln>
-        </p:spPr>
-        <p:style>
-          <a:lnRef idx="0"/>
-          <a:fillRef idx="0"/>
-          <a:effectRef idx="0"/>
-          <a:fontRef idx="minor"/>
-        </p:style>
-        <p:txBody>
-          <a:bodyPr lIns="90000" rIns="90000" tIns="45000" bIns="45000"/>
-          <a:p>
-            <a:r>
-              <a:rPr b="0" lang="es-ES" sz="1500" spc="-1" strike="noStrike">
-                <a:solidFill>
-                  <a:srgbClr val="000000"/>
-                </a:solidFill>
-                <a:uFill>
-                  <a:solidFill>
-                    <a:srgbClr val="ffffff"/>
-                  </a:solidFill>
-                </a:uFill>
-                <a:latin typeface="Arial"/>
-              </a:rPr>
-              <a:t>6.2 State</a:t>
-            </a:r>
-            <a:endParaRPr b="0" lang="es-ES" sz="1800" spc="-1" strike="noStrike">
+            <a:endParaRPr b="0" lang="es-ES" sz="1500" spc="-1" strike="noStrike">
               <a:solidFill>
                 <a:srgbClr val="000000"/>
               </a:solidFill>

</xml_diff>